<commit_message>
Added documentation and videos for code navigation / peek
</commit_message>
<xml_diff>
--- a/media/videos.pptx
+++ b/media/videos.pptx
@@ -7,6 +7,8 @@
   <p:sldIdLst>
     <p:sldId id="257" r:id="rId2"/>
     <p:sldId id="256" r:id="rId3"/>
+    <p:sldId id="258" r:id="rId4"/>
+    <p:sldId id="259" r:id="rId5"/>
   </p:sldIdLst>
   <p:sldSz cx="12192000" cy="6858000"/>
   <p:notesSz cx="6858000" cy="9144000"/>
@@ -105,6 +107,11 @@
       </a:defRPr>
     </a:lvl9pPr>
   </p:defaultTextStyle>
+  <p:extLst>
+    <p:ext uri="{EFAFB233-063F-42B5-8137-9DF3F51BA10A}">
+      <p15:sldGuideLst xmlns:p15="http://schemas.microsoft.com/office/powerpoint/2012/main"/>
+    </p:ext>
+  </p:extLst>
 </p:presentation>
 </file>
 
@@ -153,7 +160,6 @@
               <a:rPr lang="en-US"/>
               <a:t>Click to edit Master title style</a:t>
             </a:r>
-            <a:endParaRPr lang="en-US"/>
           </a:p>
         </p:txBody>
       </p:sp>
@@ -218,7 +224,6 @@
               <a:rPr lang="en-US"/>
               <a:t>Click to edit Master subtitle style</a:t>
             </a:r>
-            <a:endParaRPr lang="en-US"/>
           </a:p>
         </p:txBody>
       </p:sp>
@@ -336,7 +341,6 @@
               <a:rPr lang="en-US"/>
               <a:t>Click to edit Master title style</a:t>
             </a:r>
-            <a:endParaRPr lang="en-US"/>
           </a:p>
         </p:txBody>
       </p:sp>
@@ -388,7 +392,6 @@
               <a:rPr lang="en-US"/>
               <a:t>Fifth level</a:t>
             </a:r>
-            <a:endParaRPr lang="en-US"/>
           </a:p>
         </p:txBody>
       </p:sp>
@@ -511,7 +514,6 @@
               <a:rPr lang="en-US"/>
               <a:t>Click to edit Master title style</a:t>
             </a:r>
-            <a:endParaRPr lang="en-US"/>
           </a:p>
         </p:txBody>
       </p:sp>
@@ -568,7 +570,6 @@
               <a:rPr lang="en-US"/>
               <a:t>Fifth level</a:t>
             </a:r>
-            <a:endParaRPr lang="en-US"/>
           </a:p>
         </p:txBody>
       </p:sp>
@@ -686,7 +687,6 @@
               <a:rPr lang="en-US"/>
               <a:t>Click to edit Master title style</a:t>
             </a:r>
-            <a:endParaRPr lang="en-US"/>
           </a:p>
         </p:txBody>
       </p:sp>
@@ -738,7 +738,6 @@
               <a:rPr lang="en-US"/>
               <a:t>Fifth level</a:t>
             </a:r>
-            <a:endParaRPr lang="en-US"/>
           </a:p>
         </p:txBody>
       </p:sp>
@@ -865,7 +864,6 @@
               <a:rPr lang="en-US"/>
               <a:t>Click to edit Master title style</a:t>
             </a:r>
-            <a:endParaRPr lang="en-US"/>
           </a:p>
         </p:txBody>
       </p:sp>
@@ -1102,7 +1100,6 @@
               <a:rPr lang="en-US"/>
               <a:t>Click to edit Master title style</a:t>
             </a:r>
-            <a:endParaRPr lang="en-US"/>
           </a:p>
         </p:txBody>
       </p:sp>
@@ -1159,7 +1156,6 @@
               <a:rPr lang="en-US"/>
               <a:t>Fifth level</a:t>
             </a:r>
-            <a:endParaRPr lang="en-US"/>
           </a:p>
         </p:txBody>
       </p:sp>
@@ -1216,7 +1212,6 @@
               <a:rPr lang="en-US"/>
               <a:t>Fifth level</a:t>
             </a:r>
-            <a:endParaRPr lang="en-US"/>
           </a:p>
         </p:txBody>
       </p:sp>
@@ -1339,7 +1334,6 @@
               <a:rPr lang="en-US"/>
               <a:t>Click to edit Master title style</a:t>
             </a:r>
-            <a:endParaRPr lang="en-US"/>
           </a:p>
         </p:txBody>
       </p:sp>
@@ -1461,7 +1455,6 @@
               <a:rPr lang="en-US"/>
               <a:t>Fifth level</a:t>
             </a:r>
-            <a:endParaRPr lang="en-US"/>
           </a:p>
         </p:txBody>
       </p:sp>
@@ -1583,7 +1576,6 @@
               <a:rPr lang="en-US"/>
               <a:t>Fifth level</a:t>
             </a:r>
-            <a:endParaRPr lang="en-US"/>
           </a:p>
         </p:txBody>
       </p:sp>
@@ -1701,7 +1693,6 @@
               <a:rPr lang="en-US"/>
               <a:t>Click to edit Master title style</a:t>
             </a:r>
-            <a:endParaRPr lang="en-US"/>
           </a:p>
         </p:txBody>
       </p:sp>
@@ -1923,7 +1914,6 @@
               <a:rPr lang="en-US"/>
               <a:t>Click to edit Master title style</a:t>
             </a:r>
-            <a:endParaRPr lang="en-US"/>
           </a:p>
         </p:txBody>
       </p:sp>
@@ -2008,7 +1998,6 @@
               <a:rPr lang="en-US"/>
               <a:t>Fifth level</a:t>
             </a:r>
-            <a:endParaRPr lang="en-US"/>
           </a:p>
         </p:txBody>
       </p:sp>
@@ -2200,7 +2189,6 @@
               <a:rPr lang="en-US"/>
               <a:t>Click to edit Master title style</a:t>
             </a:r>
-            <a:endParaRPr lang="en-US"/>
           </a:p>
         </p:txBody>
       </p:sp>
@@ -2459,7 +2447,6 @@
               <a:rPr lang="en-US"/>
               <a:t>Click to edit Master title style</a:t>
             </a:r>
-            <a:endParaRPr lang="en-US"/>
           </a:p>
         </p:txBody>
       </p:sp>
@@ -2521,7 +2508,6 @@
               <a:rPr lang="en-US"/>
               <a:t>Fifth level</a:t>
             </a:r>
-            <a:endParaRPr lang="en-US"/>
           </a:p>
         </p:txBody>
       </p:sp>
@@ -2982,15 +2968,7 @@
           <a:p>
             <a:r>
               <a:rPr lang="en-US" dirty="0"/>
-              <a:t>This deck contains videos for </a:t>
-            </a:r>
-            <a:r>
-              <a:rPr lang="en-US"/>
-              <a:t>the RTVS documentation</a:t>
-            </a:r>
-            <a:r>
-              <a:rPr lang="en-US" dirty="0"/>
-              <a:t>.</a:t>
+              <a:t>This deck contains videos for the RTVS documentation.</a:t>
             </a:r>
           </a:p>
         </p:txBody>
@@ -3162,6 +3140,340 @@
                 </p:cTn>
                 <p:tgtEl>
                   <p:spTgt spid="7"/>
+                </p:tgtEl>
+              </p:cMediaNode>
+            </p:video>
+          </p:childTnLst>
+        </p:cTn>
+      </p:par>
+    </p:tnLst>
+  </p:timing>
+</p:sld>
+</file>
+
+<file path=ppt/slides/slide3.xml><?xml version="1.0" encoding="utf-8"?>
+<p:sld xmlns:a="http://schemas.openxmlformats.org/drawingml/2006/main" xmlns:r="http://schemas.openxmlformats.org/officeDocument/2006/relationships" xmlns:p="http://schemas.openxmlformats.org/presentationml/2006/main">
+  <p:cSld>
+    <p:spTree>
+      <p:nvGrpSpPr>
+        <p:cNvPr id="1" name=""/>
+        <p:cNvGrpSpPr/>
+        <p:nvPr/>
+      </p:nvGrpSpPr>
+      <p:grpSpPr>
+        <a:xfrm>
+          <a:off x="0" y="0"/>
+          <a:ext cx="0" cy="0"/>
+          <a:chOff x="0" y="0"/>
+          <a:chExt cx="0" cy="0"/>
+        </a:xfrm>
+      </p:grpSpPr>
+      <p:sp>
+        <p:nvSpPr>
+          <p:cNvPr id="2" name="Title 1"/>
+          <p:cNvSpPr>
+            <a:spLocks noGrp="1"/>
+          </p:cNvSpPr>
+          <p:nvPr>
+            <p:ph type="title"/>
+          </p:nvPr>
+        </p:nvSpPr>
+        <p:spPr/>
+        <p:txBody>
+          <a:bodyPr/>
+          <a:lstStyle/>
+          <a:p>
+            <a:r>
+              <a:rPr lang="en-US"/>
+              <a:t>goto</a:t>
+            </a:r>
+            <a:r>
+              <a:rPr lang="en-US" dirty="0"/>
+              <a:t> definition</a:t>
+            </a:r>
+          </a:p>
+        </p:txBody>
+      </p:sp>
+      <p:pic>
+        <p:nvPicPr>
+          <p:cNvPr id="3" name="AB0F190">
+            <a:hlinkClick r:id="" action="ppaction://media"/>
+          </p:cNvPr>
+          <p:cNvPicPr>
+            <a:picLocks noChangeAspect="1"/>
+          </p:cNvPicPr>
+          <p:nvPr>
+            <a:videoFile r:link="rId2"/>
+            <p:extLst>
+              <p:ext uri="{DAA4B4D4-6D71-4841-9C94-3DE7FCFB9230}">
+                <p14:media xmlns:p14="http://schemas.microsoft.com/office/powerpoint/2010/main" r:embed="rId1"/>
+              </p:ext>
+            </p:extLst>
+          </p:nvPr>
+        </p:nvPicPr>
+        <p:blipFill>
+          <a:blip r:embed="rId4"/>
+          <a:stretch>
+            <a:fillRect/>
+          </a:stretch>
+        </p:blipFill>
+        <p:spPr>
+          <a:xfrm>
+            <a:off x="3790950" y="990600"/>
+            <a:ext cx="4610100" cy="4876800"/>
+          </a:xfrm>
+          <a:prstGeom prst="rect">
+            <a:avLst/>
+          </a:prstGeom>
+        </p:spPr>
+      </p:pic>
+    </p:spTree>
+    <p:extLst>
+      <p:ext uri="{BB962C8B-B14F-4D97-AF65-F5344CB8AC3E}">
+        <p14:creationId xmlns:p14="http://schemas.microsoft.com/office/powerpoint/2010/main" val="3597894909"/>
+      </p:ext>
+    </p:extLst>
+  </p:cSld>
+  <p:clrMapOvr>
+    <a:masterClrMapping/>
+  </p:clrMapOvr>
+  <p:timing>
+    <p:tnLst>
+      <p:par>
+        <p:cTn id="1" dur="indefinite" restart="never" nodeType="tmRoot">
+          <p:childTnLst>
+            <p:seq concurrent="1" nextAc="seek">
+              <p:cTn id="2" restart="whenNotActive" fill="hold" evtFilter="cancelBubble" nodeType="interactiveSeq">
+                <p:stCondLst>
+                  <p:cond evt="onClick" delay="0">
+                    <p:tgtEl>
+                      <p:spTgt spid="3"/>
+                    </p:tgtEl>
+                  </p:cond>
+                </p:stCondLst>
+                <p:endSync evt="end" delay="0">
+                  <p:rtn val="all"/>
+                </p:endSync>
+                <p:childTnLst>
+                  <p:par>
+                    <p:cTn id="3" fill="hold">
+                      <p:stCondLst>
+                        <p:cond delay="0"/>
+                      </p:stCondLst>
+                      <p:childTnLst>
+                        <p:par>
+                          <p:cTn id="4" fill="hold">
+                            <p:stCondLst>
+                              <p:cond delay="0"/>
+                            </p:stCondLst>
+                            <p:childTnLst>
+                              <p:par>
+                                <p:cTn id="5" presetID="2" presetClass="mediacall" presetSubtype="0" fill="hold" nodeType="clickEffect">
+                                  <p:stCondLst>
+                                    <p:cond delay="0"/>
+                                  </p:stCondLst>
+                                  <p:childTnLst>
+                                    <p:cmd type="call" cmd="togglePause">
+                                      <p:cBhvr>
+                                        <p:cTn id="6" dur="1" fill="hold"/>
+                                        <p:tgtEl>
+                                          <p:spTgt spid="3"/>
+                                        </p:tgtEl>
+                                      </p:cBhvr>
+                                    </p:cmd>
+                                  </p:childTnLst>
+                                </p:cTn>
+                              </p:par>
+                            </p:childTnLst>
+                          </p:cTn>
+                        </p:par>
+                      </p:childTnLst>
+                    </p:cTn>
+                  </p:par>
+                </p:childTnLst>
+              </p:cTn>
+              <p:nextCondLst>
+                <p:cond evt="onClick" delay="0">
+                  <p:tgtEl>
+                    <p:spTgt spid="3"/>
+                  </p:tgtEl>
+                </p:cond>
+              </p:nextCondLst>
+            </p:seq>
+            <p:video>
+              <p:cMediaNode vol="80000">
+                <p:cTn id="7" fill="hold" display="0">
+                  <p:stCondLst>
+                    <p:cond delay="indefinite"/>
+                  </p:stCondLst>
+                </p:cTn>
+                <p:tgtEl>
+                  <p:spTgt spid="3"/>
+                </p:tgtEl>
+              </p:cMediaNode>
+            </p:video>
+          </p:childTnLst>
+        </p:cTn>
+      </p:par>
+    </p:tnLst>
+  </p:timing>
+</p:sld>
+</file>
+
+<file path=ppt/slides/slide4.xml><?xml version="1.0" encoding="utf-8"?>
+<p:sld xmlns:a="http://schemas.openxmlformats.org/drawingml/2006/main" xmlns:r="http://schemas.openxmlformats.org/officeDocument/2006/relationships" xmlns:p="http://schemas.openxmlformats.org/presentationml/2006/main">
+  <p:cSld>
+    <p:spTree>
+      <p:nvGrpSpPr>
+        <p:cNvPr id="1" name=""/>
+        <p:cNvGrpSpPr/>
+        <p:nvPr/>
+      </p:nvGrpSpPr>
+      <p:grpSpPr>
+        <a:xfrm>
+          <a:off x="0" y="0"/>
+          <a:ext cx="0" cy="0"/>
+          <a:chOff x="0" y="0"/>
+          <a:chExt cx="0" cy="0"/>
+        </a:xfrm>
+      </p:grpSpPr>
+      <p:sp>
+        <p:nvSpPr>
+          <p:cNvPr id="2" name="Title 1"/>
+          <p:cNvSpPr>
+            <a:spLocks noGrp="1"/>
+          </p:cNvSpPr>
+          <p:nvPr>
+            <p:ph type="title"/>
+          </p:nvPr>
+        </p:nvSpPr>
+        <p:spPr/>
+        <p:txBody>
+          <a:bodyPr/>
+          <a:lstStyle/>
+          <a:p>
+            <a:r>
+              <a:rPr lang="en-US" dirty="0"/>
+              <a:t>peek definition</a:t>
+            </a:r>
+          </a:p>
+        </p:txBody>
+      </p:sp>
+      <p:pic>
+        <p:nvPicPr>
+          <p:cNvPr id="3" name="73CC91C">
+            <a:hlinkClick r:id="" action="ppaction://media"/>
+          </p:cNvPr>
+          <p:cNvPicPr>
+            <a:picLocks noChangeAspect="1"/>
+          </p:cNvPicPr>
+          <p:nvPr>
+            <a:videoFile r:link="rId2"/>
+            <p:extLst>
+              <p:ext uri="{DAA4B4D4-6D71-4841-9C94-3DE7FCFB9230}">
+                <p14:media xmlns:p14="http://schemas.microsoft.com/office/powerpoint/2010/main" r:embed="rId1"/>
+              </p:ext>
+            </p:extLst>
+          </p:nvPr>
+        </p:nvPicPr>
+        <p:blipFill>
+          <a:blip r:embed="rId4"/>
+          <a:stretch>
+            <a:fillRect/>
+          </a:stretch>
+        </p:blipFill>
+        <p:spPr>
+          <a:xfrm>
+            <a:off x="1968500" y="806450"/>
+            <a:ext cx="8255000" cy="5245100"/>
+          </a:xfrm>
+          <a:prstGeom prst="rect">
+            <a:avLst/>
+          </a:prstGeom>
+        </p:spPr>
+      </p:pic>
+    </p:spTree>
+    <p:extLst>
+      <p:ext uri="{BB962C8B-B14F-4D97-AF65-F5344CB8AC3E}">
+        <p14:creationId xmlns:p14="http://schemas.microsoft.com/office/powerpoint/2010/main" val="3753334853"/>
+      </p:ext>
+    </p:extLst>
+  </p:cSld>
+  <p:clrMapOvr>
+    <a:masterClrMapping/>
+  </p:clrMapOvr>
+  <p:timing>
+    <p:tnLst>
+      <p:par>
+        <p:cTn id="1" dur="indefinite" restart="never" nodeType="tmRoot">
+          <p:childTnLst>
+            <p:seq concurrent="1" nextAc="seek">
+              <p:cTn id="2" restart="whenNotActive" fill="hold" evtFilter="cancelBubble" nodeType="interactiveSeq">
+                <p:stCondLst>
+                  <p:cond evt="onClick" delay="0">
+                    <p:tgtEl>
+                      <p:spTgt spid="3"/>
+                    </p:tgtEl>
+                  </p:cond>
+                </p:stCondLst>
+                <p:endSync evt="end" delay="0">
+                  <p:rtn val="all"/>
+                </p:endSync>
+                <p:childTnLst>
+                  <p:par>
+                    <p:cTn id="3" fill="hold">
+                      <p:stCondLst>
+                        <p:cond delay="0"/>
+                      </p:stCondLst>
+                      <p:childTnLst>
+                        <p:par>
+                          <p:cTn id="4" fill="hold">
+                            <p:stCondLst>
+                              <p:cond delay="0"/>
+                            </p:stCondLst>
+                            <p:childTnLst>
+                              <p:par>
+                                <p:cTn id="5" presetID="2" presetClass="mediacall" presetSubtype="0" fill="hold" nodeType="clickEffect">
+                                  <p:stCondLst>
+                                    <p:cond delay="0"/>
+                                  </p:stCondLst>
+                                  <p:childTnLst>
+                                    <p:cmd type="call" cmd="togglePause">
+                                      <p:cBhvr>
+                                        <p:cTn id="6" dur="1" fill="hold"/>
+                                        <p:tgtEl>
+                                          <p:spTgt spid="3"/>
+                                        </p:tgtEl>
+                                      </p:cBhvr>
+                                    </p:cmd>
+                                  </p:childTnLst>
+                                </p:cTn>
+                              </p:par>
+                            </p:childTnLst>
+                          </p:cTn>
+                        </p:par>
+                      </p:childTnLst>
+                    </p:cTn>
+                  </p:par>
+                </p:childTnLst>
+              </p:cTn>
+              <p:nextCondLst>
+                <p:cond evt="onClick" delay="0">
+                  <p:tgtEl>
+                    <p:spTgt spid="3"/>
+                  </p:tgtEl>
+                </p:cond>
+              </p:nextCondLst>
+            </p:seq>
+            <p:video>
+              <p:cMediaNode vol="80000">
+                <p:cTn id="7" fill="hold" display="0">
+                  <p:stCondLst>
+                    <p:cond delay="indefinite"/>
+                  </p:stCondLst>
+                </p:cTn>
+                <p:tgtEl>
+                  <p:spTgt spid="3"/>
                 </p:tgtEl>
               </p:cMediaNode>
             </p:video>

</xml_diff>